<commit_message>
partial view and section
</commit_message>
<xml_diff>
--- a/Razor pages.pptx
+++ b/Razor pages.pptx
@@ -287,7 +287,7 @@
       <p15:sldGuideLst xmlns:p15="http://schemas.microsoft.com/office/powerpoint/2012/main"/>
     </p:ext>
     <p:ext uri="http://customooxmlschemas.google.com/">
-      <go:slidesCustomData xmlns="" xmlns:mc="http://schemas.openxmlformats.org/markup-compatibility/2006" xmlns:mv="urn:schemas-microsoft-com:mac:vml" xmlns:c="http://schemas.openxmlformats.org/drawingml/2006/chart" xmlns:dgm="http://schemas.openxmlformats.org/drawingml/2006/diagram" xmlns:o="urn:schemas-microsoft-com:office:office" xmlns:v="urn:schemas-microsoft-com:vml" xmlns:pvml="urn:schemas-microsoft-com:office:powerpoint" xmlns:com="http://schemas.openxmlformats.org/drawingml/2006/compatibility" xmlns:p14="http://schemas.microsoft.com/office/powerpoint/2010/main" xmlns:p15="http://schemas.microsoft.com/office/powerpoint/2012/main" xmlns:ahyp="http://schemas.microsoft.com/office/drawing/2018/hyperlinkcolor" xmlns:go="http://customooxmlschemas.google.com/" r:id="rId46" roundtripDataSignature="AMtx7mjVEwqA5jePl45nlKRjSNtdNd4Yxw=="/>
+      <go:slidesCustomData xmlns:go="http://customooxmlschemas.google.com/" xmlns:ahyp="http://schemas.microsoft.com/office/drawing/2018/hyperlinkcolor" xmlns:p15="http://schemas.microsoft.com/office/powerpoint/2012/main" xmlns:p14="http://schemas.microsoft.com/office/powerpoint/2010/main" xmlns:com="http://schemas.openxmlformats.org/drawingml/2006/compatibility" xmlns:pvml="urn:schemas-microsoft-com:office:powerpoint" xmlns:v="urn:schemas-microsoft-com:vml" xmlns:o="urn:schemas-microsoft-com:office:office" xmlns:dgm="http://schemas.openxmlformats.org/drawingml/2006/diagram" xmlns:c="http://schemas.openxmlformats.org/drawingml/2006/chart" xmlns:mv="urn:schemas-microsoft-com:mac:vml" xmlns:mc="http://schemas.openxmlformats.org/markup-compatibility/2006" xmlns="" r:id="rId46" roundtripDataSignature="AMtx7mjVEwqA5jePl45nlKRjSNtdNd4Yxw=="/>
     </p:ext>
   </p:extLst>
 </p:presentation>
@@ -34769,7 +34769,79 @@
                 <a:cs typeface="Times New Roman"/>
                 <a:sym typeface="Times New Roman"/>
               </a:rPr>
-              <a:t> page.</a:t>
+              <a:t> page, </a:t>
+            </a:r>
+            <a:r>
+              <a:rPr lang="en-US" dirty="0" err="1">
+                <a:solidFill>
+                  <a:schemeClr val="lt1"/>
+                </a:solidFill>
+                <a:latin typeface="Times New Roman"/>
+                <a:ea typeface="Times New Roman"/>
+                <a:cs typeface="Times New Roman"/>
+                <a:sym typeface="Times New Roman"/>
+              </a:rPr>
+              <a:t>giúp</a:t>
+            </a:r>
+            <a:r>
+              <a:rPr lang="en-US" dirty="0">
+                <a:solidFill>
+                  <a:schemeClr val="lt1"/>
+                </a:solidFill>
+                <a:latin typeface="Times New Roman"/>
+                <a:ea typeface="Times New Roman"/>
+                <a:cs typeface="Times New Roman"/>
+                <a:sym typeface="Times New Roman"/>
+              </a:rPr>
+              <a:t> </a:t>
+            </a:r>
+            <a:r>
+              <a:rPr lang="en-US" dirty="0" err="1">
+                <a:solidFill>
+                  <a:schemeClr val="lt1"/>
+                </a:solidFill>
+                <a:latin typeface="Times New Roman"/>
+                <a:ea typeface="Times New Roman"/>
+                <a:cs typeface="Times New Roman"/>
+                <a:sym typeface="Times New Roman"/>
+              </a:rPr>
+              <a:t>truyền</a:t>
+            </a:r>
+            <a:r>
+              <a:rPr lang="en-US" dirty="0">
+                <a:solidFill>
+                  <a:schemeClr val="lt1"/>
+                </a:solidFill>
+                <a:latin typeface="Times New Roman"/>
+                <a:ea typeface="Times New Roman"/>
+                <a:cs typeface="Times New Roman"/>
+                <a:sym typeface="Times New Roman"/>
+              </a:rPr>
+              <a:t> </a:t>
+            </a:r>
+            <a:r>
+              <a:rPr lang="en-US" dirty="0" err="1">
+                <a:solidFill>
+                  <a:schemeClr val="lt1"/>
+                </a:solidFill>
+                <a:latin typeface="Times New Roman"/>
+                <a:ea typeface="Times New Roman"/>
+                <a:cs typeface="Times New Roman"/>
+                <a:sym typeface="Times New Roman"/>
+              </a:rPr>
+              <a:t>tham</a:t>
+            </a:r>
+            <a:r>
+              <a:rPr lang="en-US" dirty="0">
+                <a:solidFill>
+                  <a:schemeClr val="lt1"/>
+                </a:solidFill>
+                <a:latin typeface="Times New Roman"/>
+                <a:ea typeface="Times New Roman"/>
+                <a:cs typeface="Times New Roman"/>
+                <a:sym typeface="Times New Roman"/>
+              </a:rPr>
+              <a:t> số qua partial view</a:t>
             </a:r>
           </a:p>
           <a:p>
@@ -35092,38 +35164,8 @@
         </p:blipFill>
         <p:spPr>
           <a:xfrm>
-            <a:off x="677316" y="1557635"/>
+            <a:off x="815879" y="1429083"/>
             <a:ext cx="7730954" cy="2088551"/>
-          </a:xfrm>
-          <a:prstGeom prst="rect">
-            <a:avLst/>
-          </a:prstGeom>
-        </p:spPr>
-      </p:pic>
-      <p:pic>
-        <p:nvPicPr>
-          <p:cNvPr id="3" name="Picture 2">
-            <a:extLst>
-              <a:ext uri="{FF2B5EF4-FFF2-40B4-BE49-F238E27FC236}">
-                <a16:creationId xmlns:a16="http://schemas.microsoft.com/office/drawing/2014/main" id="{EB05828C-8721-47B1-9A66-8BF7ED4EB2CE}"/>
-              </a:ext>
-            </a:extLst>
-          </p:cNvPr>
-          <p:cNvPicPr>
-            <a:picLocks noChangeAspect="1"/>
-          </p:cNvPicPr>
-          <p:nvPr/>
-        </p:nvPicPr>
-        <p:blipFill>
-          <a:blip r:embed="rId5"/>
-          <a:stretch>
-            <a:fillRect/>
-          </a:stretch>
-        </p:blipFill>
-        <p:spPr>
-          <a:xfrm>
-            <a:off x="3246042" y="4600078"/>
-            <a:ext cx="2605472" cy="2088174"/>
           </a:xfrm>
           <a:prstGeom prst="rect">
             <a:avLst/>
@@ -35496,6 +35538,156 @@
           </a:ln>
         </p:spPr>
       </p:pic>
+      <p:pic>
+        <p:nvPicPr>
+          <p:cNvPr id="3" name="Picture 2">
+            <a:extLst>
+              <a:ext uri="{FF2B5EF4-FFF2-40B4-BE49-F238E27FC236}">
+                <a16:creationId xmlns:a16="http://schemas.microsoft.com/office/drawing/2014/main" id="{6354BA74-F09D-4FEA-BF77-8B24472E1C57}"/>
+              </a:ext>
+            </a:extLst>
+          </p:cNvPr>
+          <p:cNvPicPr>
+            <a:picLocks noChangeAspect="1"/>
+          </p:cNvPicPr>
+          <p:nvPr/>
+        </p:nvPicPr>
+        <p:blipFill>
+          <a:blip r:embed="rId4"/>
+          <a:stretch>
+            <a:fillRect/>
+          </a:stretch>
+        </p:blipFill>
+        <p:spPr>
+          <a:xfrm>
+            <a:off x="677316" y="1451627"/>
+            <a:ext cx="4846740" cy="3208298"/>
+          </a:xfrm>
+          <a:prstGeom prst="rect">
+            <a:avLst/>
+          </a:prstGeom>
+        </p:spPr>
+      </p:pic>
+      <p:pic>
+        <p:nvPicPr>
+          <p:cNvPr id="4" name="Picture 3">
+            <a:extLst>
+              <a:ext uri="{FF2B5EF4-FFF2-40B4-BE49-F238E27FC236}">
+                <a16:creationId xmlns:a16="http://schemas.microsoft.com/office/drawing/2014/main" id="{20206DA8-06B8-4493-B373-5130544881D9}"/>
+              </a:ext>
+            </a:extLst>
+          </p:cNvPr>
+          <p:cNvPicPr>
+            <a:picLocks noChangeAspect="1"/>
+          </p:cNvPicPr>
+          <p:nvPr/>
+        </p:nvPicPr>
+        <p:blipFill>
+          <a:blip r:embed="rId5"/>
+          <a:stretch>
+            <a:fillRect/>
+          </a:stretch>
+        </p:blipFill>
+        <p:spPr>
+          <a:xfrm>
+            <a:off x="5809467" y="4244695"/>
+            <a:ext cx="6096001" cy="594412"/>
+          </a:xfrm>
+          <a:prstGeom prst="rect">
+            <a:avLst/>
+          </a:prstGeom>
+        </p:spPr>
+      </p:pic>
+      <p:pic>
+        <p:nvPicPr>
+          <p:cNvPr id="5" name="Picture 4">
+            <a:extLst>
+              <a:ext uri="{FF2B5EF4-FFF2-40B4-BE49-F238E27FC236}">
+                <a16:creationId xmlns:a16="http://schemas.microsoft.com/office/drawing/2014/main" id="{43B3323C-5DCE-4517-B4A6-14AFFECB764A}"/>
+              </a:ext>
+            </a:extLst>
+          </p:cNvPr>
+          <p:cNvPicPr>
+            <a:picLocks noChangeAspect="1"/>
+          </p:cNvPicPr>
+          <p:nvPr/>
+        </p:nvPicPr>
+        <p:blipFill>
+          <a:blip r:embed="rId6"/>
+          <a:stretch>
+            <a:fillRect/>
+          </a:stretch>
+        </p:blipFill>
+        <p:spPr>
+          <a:xfrm>
+            <a:off x="5809467" y="1451627"/>
+            <a:ext cx="5685013" cy="518205"/>
+          </a:xfrm>
+          <a:prstGeom prst="rect">
+            <a:avLst/>
+          </a:prstGeom>
+        </p:spPr>
+      </p:pic>
+      <p:pic>
+        <p:nvPicPr>
+          <p:cNvPr id="6" name="Picture 5">
+            <a:extLst>
+              <a:ext uri="{FF2B5EF4-FFF2-40B4-BE49-F238E27FC236}">
+                <a16:creationId xmlns:a16="http://schemas.microsoft.com/office/drawing/2014/main" id="{1D082520-7CD9-4E35-BF3E-FC564E11C6CB}"/>
+              </a:ext>
+            </a:extLst>
+          </p:cNvPr>
+          <p:cNvPicPr>
+            <a:picLocks noChangeAspect="1"/>
+          </p:cNvPicPr>
+          <p:nvPr/>
+        </p:nvPicPr>
+        <p:blipFill>
+          <a:blip r:embed="rId7"/>
+          <a:stretch>
+            <a:fillRect/>
+          </a:stretch>
+        </p:blipFill>
+        <p:spPr>
+          <a:xfrm>
+            <a:off x="6057006" y="2096086"/>
+            <a:ext cx="5189934" cy="2022355"/>
+          </a:xfrm>
+          <a:prstGeom prst="rect">
+            <a:avLst/>
+          </a:prstGeom>
+        </p:spPr>
+      </p:pic>
+      <p:pic>
+        <p:nvPicPr>
+          <p:cNvPr id="7" name="Picture 6">
+            <a:extLst>
+              <a:ext uri="{FF2B5EF4-FFF2-40B4-BE49-F238E27FC236}">
+                <a16:creationId xmlns:a16="http://schemas.microsoft.com/office/drawing/2014/main" id="{47BC21AB-0242-4896-ACB7-60B54D6787E9}"/>
+              </a:ext>
+            </a:extLst>
+          </p:cNvPr>
+          <p:cNvPicPr>
+            <a:picLocks noChangeAspect="1"/>
+          </p:cNvPicPr>
+          <p:nvPr/>
+        </p:nvPicPr>
+        <p:blipFill>
+          <a:blip r:embed="rId8"/>
+          <a:stretch>
+            <a:fillRect/>
+          </a:stretch>
+        </p:blipFill>
+        <p:spPr>
+          <a:xfrm>
+            <a:off x="6876662" y="4965361"/>
+            <a:ext cx="4045760" cy="1641556"/>
+          </a:xfrm>
+          <a:prstGeom prst="rect">
+            <a:avLst/>
+          </a:prstGeom>
+        </p:spPr>
+      </p:pic>
     </p:spTree>
   </p:cSld>
   <p:clrMapOvr>
@@ -35559,7 +35751,7 @@
               </a:spcAft>
               <a:buNone/>
             </a:pPr>
-            <a:endParaRPr>
+            <a:endParaRPr dirty="0">
               <a:solidFill>
                 <a:schemeClr val="lt1"/>
               </a:solidFill>
@@ -35582,7 +35774,7 @@
               </a:spcAft>
               <a:buNone/>
             </a:pPr>
-            <a:endParaRPr sz="1150">
+            <a:endParaRPr sz="1150" dirty="0">
               <a:solidFill>
                 <a:srgbClr val="D69D85"/>
               </a:solidFill>
@@ -35605,7 +35797,7 @@
               </a:spcAft>
               <a:buNone/>
             </a:pPr>
-            <a:endParaRPr>
+            <a:endParaRPr dirty="0">
               <a:solidFill>
                 <a:schemeClr val="lt1"/>
               </a:solidFill>
@@ -35736,66 +35928,6 @@
           </a:ln>
         </p:spPr>
       </p:pic>
-      <p:pic>
-        <p:nvPicPr>
-          <p:cNvPr id="2" name="Picture 1">
-            <a:extLst>
-              <a:ext uri="{FF2B5EF4-FFF2-40B4-BE49-F238E27FC236}">
-                <a16:creationId xmlns:a16="http://schemas.microsoft.com/office/drawing/2014/main" id="{E0BF357A-33A6-47FB-844F-8C9BE5D85386}"/>
-              </a:ext>
-            </a:extLst>
-          </p:cNvPr>
-          <p:cNvPicPr>
-            <a:picLocks noChangeAspect="1"/>
-          </p:cNvPicPr>
-          <p:nvPr/>
-        </p:nvPicPr>
-        <p:blipFill>
-          <a:blip r:embed="rId4"/>
-          <a:stretch>
-            <a:fillRect/>
-          </a:stretch>
-        </p:blipFill>
-        <p:spPr>
-          <a:xfrm>
-            <a:off x="815879" y="2747541"/>
-            <a:ext cx="6171990" cy="3410274"/>
-          </a:xfrm>
-          <a:prstGeom prst="rect">
-            <a:avLst/>
-          </a:prstGeom>
-        </p:spPr>
-      </p:pic>
-      <p:pic>
-        <p:nvPicPr>
-          <p:cNvPr id="3" name="Picture 2">
-            <a:extLst>
-              <a:ext uri="{FF2B5EF4-FFF2-40B4-BE49-F238E27FC236}">
-                <a16:creationId xmlns:a16="http://schemas.microsoft.com/office/drawing/2014/main" id="{ED125770-3D2C-4C5D-8C4C-D020D26F9772}"/>
-              </a:ext>
-            </a:extLst>
-          </p:cNvPr>
-          <p:cNvPicPr>
-            <a:picLocks noChangeAspect="1"/>
-          </p:cNvPicPr>
-          <p:nvPr/>
-        </p:nvPicPr>
-        <p:blipFill>
-          <a:blip r:embed="rId5"/>
-          <a:stretch>
-            <a:fillRect/>
-          </a:stretch>
-        </p:blipFill>
-        <p:spPr>
-          <a:xfrm>
-            <a:off x="7354357" y="1190265"/>
-            <a:ext cx="4313294" cy="4328535"/>
-          </a:xfrm>
-          <a:prstGeom prst="rect">
-            <a:avLst/>
-          </a:prstGeom>
-        </p:spPr>
-      </p:pic>
       <p:sp>
         <p:nvSpPr>
           <p:cNvPr id="10" name="Google Shape;289;geef53d5d55_1_89">
@@ -35813,7 +35945,7 @@
         <p:spPr>
           <a:xfrm>
             <a:off x="388076" y="1666127"/>
-            <a:ext cx="8596800" cy="2162828"/>
+            <a:ext cx="8596800" cy="848339"/>
           </a:xfrm>
           <a:prstGeom prst="rect">
             <a:avLst/>
@@ -36130,6 +36262,96 @@
           </a:p>
         </p:txBody>
       </p:sp>
+      <p:pic>
+        <p:nvPicPr>
+          <p:cNvPr id="4" name="Picture 3">
+            <a:extLst>
+              <a:ext uri="{FF2B5EF4-FFF2-40B4-BE49-F238E27FC236}">
+                <a16:creationId xmlns:a16="http://schemas.microsoft.com/office/drawing/2014/main" id="{48130021-E297-45E3-9EA9-2BBEBBD87F34}"/>
+              </a:ext>
+            </a:extLst>
+          </p:cNvPr>
+          <p:cNvPicPr>
+            <a:picLocks noChangeAspect="1"/>
+          </p:cNvPicPr>
+          <p:nvPr/>
+        </p:nvPicPr>
+        <p:blipFill>
+          <a:blip r:embed="rId4"/>
+          <a:stretch>
+            <a:fillRect/>
+          </a:stretch>
+        </p:blipFill>
+        <p:spPr>
+          <a:xfrm>
+            <a:off x="516906" y="2090296"/>
+            <a:ext cx="6173143" cy="2400667"/>
+          </a:xfrm>
+          <a:prstGeom prst="rect">
+            <a:avLst/>
+          </a:prstGeom>
+        </p:spPr>
+      </p:pic>
+      <p:pic>
+        <p:nvPicPr>
+          <p:cNvPr id="5" name="Picture 4">
+            <a:extLst>
+              <a:ext uri="{FF2B5EF4-FFF2-40B4-BE49-F238E27FC236}">
+                <a16:creationId xmlns:a16="http://schemas.microsoft.com/office/drawing/2014/main" id="{536C74EC-D6BC-47D7-AE1A-FE36D06B1FCD}"/>
+              </a:ext>
+            </a:extLst>
+          </p:cNvPr>
+          <p:cNvPicPr>
+            <a:picLocks noChangeAspect="1"/>
+          </p:cNvPicPr>
+          <p:nvPr/>
+        </p:nvPicPr>
+        <p:blipFill>
+          <a:blip r:embed="rId5"/>
+          <a:stretch>
+            <a:fillRect/>
+          </a:stretch>
+        </p:blipFill>
+        <p:spPr>
+          <a:xfrm>
+            <a:off x="1212980" y="4687792"/>
+            <a:ext cx="5241725" cy="1354063"/>
+          </a:xfrm>
+          <a:prstGeom prst="rect">
+            <a:avLst/>
+          </a:prstGeom>
+        </p:spPr>
+      </p:pic>
+      <p:pic>
+        <p:nvPicPr>
+          <p:cNvPr id="6" name="Picture 5">
+            <a:extLst>
+              <a:ext uri="{FF2B5EF4-FFF2-40B4-BE49-F238E27FC236}">
+                <a16:creationId xmlns:a16="http://schemas.microsoft.com/office/drawing/2014/main" id="{74314F1C-A892-4278-90C1-51C03C6D1528}"/>
+              </a:ext>
+            </a:extLst>
+          </p:cNvPr>
+          <p:cNvPicPr>
+            <a:picLocks noChangeAspect="1"/>
+          </p:cNvPicPr>
+          <p:nvPr/>
+        </p:nvPicPr>
+        <p:blipFill>
+          <a:blip r:embed="rId6"/>
+          <a:stretch>
+            <a:fillRect/>
+          </a:stretch>
+        </p:blipFill>
+        <p:spPr>
+          <a:xfrm>
+            <a:off x="6690049" y="4760483"/>
+            <a:ext cx="5325294" cy="1168839"/>
+          </a:xfrm>
+          <a:prstGeom prst="rect">
+            <a:avLst/>
+          </a:prstGeom>
+        </p:spPr>
+      </p:pic>
     </p:spTree>
   </p:cSld>
   <p:clrMapOvr>
@@ -36322,6 +36544,36 @@
           <a:ln>
             <a:noFill/>
           </a:ln>
+        </p:spPr>
+      </p:pic>
+      <p:pic>
+        <p:nvPicPr>
+          <p:cNvPr id="2" name="Picture 1">
+            <a:extLst>
+              <a:ext uri="{FF2B5EF4-FFF2-40B4-BE49-F238E27FC236}">
+                <a16:creationId xmlns:a16="http://schemas.microsoft.com/office/drawing/2014/main" id="{A766A6DA-EC85-422D-81AD-CD42D8676D7D}"/>
+              </a:ext>
+            </a:extLst>
+          </p:cNvPr>
+          <p:cNvPicPr>
+            <a:picLocks noChangeAspect="1"/>
+          </p:cNvPicPr>
+          <p:nvPr/>
+        </p:nvPicPr>
+        <p:blipFill>
+          <a:blip r:embed="rId4"/>
+          <a:stretch>
+            <a:fillRect/>
+          </a:stretch>
+        </p:blipFill>
+        <p:spPr>
+          <a:xfrm>
+            <a:off x="677316" y="1643983"/>
+            <a:ext cx="8245151" cy="4311507"/>
+          </a:xfrm>
+          <a:prstGeom prst="rect">
+            <a:avLst/>
+          </a:prstGeom>
         </p:spPr>
       </p:pic>
     </p:spTree>

</xml_diff>

<commit_message>
View component with tag helper
</commit_message>
<xml_diff>
--- a/Razor pages.pptx
+++ b/Razor pages.pptx
@@ -287,7 +287,7 @@
       <p15:sldGuideLst xmlns:p15="http://schemas.microsoft.com/office/powerpoint/2012/main"/>
     </p:ext>
     <p:ext uri="http://customooxmlschemas.google.com/">
-      <go:slidesCustomData xmlns:go="http://customooxmlschemas.google.com/" xmlns:ahyp="http://schemas.microsoft.com/office/drawing/2018/hyperlinkcolor" xmlns:p15="http://schemas.microsoft.com/office/powerpoint/2012/main" xmlns:p14="http://schemas.microsoft.com/office/powerpoint/2010/main" xmlns:com="http://schemas.openxmlformats.org/drawingml/2006/compatibility" xmlns:pvml="urn:schemas-microsoft-com:office:powerpoint" xmlns:v="urn:schemas-microsoft-com:vml" xmlns:o="urn:schemas-microsoft-com:office:office" xmlns:dgm="http://schemas.openxmlformats.org/drawingml/2006/diagram" xmlns:c="http://schemas.openxmlformats.org/drawingml/2006/chart" xmlns:mv="urn:schemas-microsoft-com:mac:vml" xmlns:mc="http://schemas.openxmlformats.org/markup-compatibility/2006" xmlns="" r:id="rId46" roundtripDataSignature="AMtx7mjVEwqA5jePl45nlKRjSNtdNd4Yxw=="/>
+      <go:slidesCustomData xmlns="" xmlns:mc="http://schemas.openxmlformats.org/markup-compatibility/2006" xmlns:mv="urn:schemas-microsoft-com:mac:vml" xmlns:c="http://schemas.openxmlformats.org/drawingml/2006/chart" xmlns:dgm="http://schemas.openxmlformats.org/drawingml/2006/diagram" xmlns:o="urn:schemas-microsoft-com:office:office" xmlns:v="urn:schemas-microsoft-com:vml" xmlns:pvml="urn:schemas-microsoft-com:office:powerpoint" xmlns:com="http://schemas.openxmlformats.org/drawingml/2006/compatibility" xmlns:p14="http://schemas.microsoft.com/office/powerpoint/2010/main" xmlns:p15="http://schemas.microsoft.com/office/powerpoint/2012/main" xmlns:ahyp="http://schemas.microsoft.com/office/drawing/2018/hyperlinkcolor" xmlns:go="http://customooxmlschemas.google.com/" r:id="rId46" roundtripDataSignature="AMtx7mjVEwqA5jePl45nlKRjSNtdNd4Yxw=="/>
     </p:ext>
   </p:extLst>
 </p:presentation>
@@ -36725,66 +36725,6 @@
           </a:ln>
         </p:spPr>
       </p:pic>
-      <p:pic>
-        <p:nvPicPr>
-          <p:cNvPr id="4" name="Picture 3">
-            <a:extLst>
-              <a:ext uri="{FF2B5EF4-FFF2-40B4-BE49-F238E27FC236}">
-                <a16:creationId xmlns:a16="http://schemas.microsoft.com/office/drawing/2014/main" id="{4349322F-CAA6-452F-9C22-EEB961D36BF1}"/>
-              </a:ext>
-            </a:extLst>
-          </p:cNvPr>
-          <p:cNvPicPr>
-            <a:picLocks noChangeAspect="1"/>
-          </p:cNvPicPr>
-          <p:nvPr/>
-        </p:nvPicPr>
-        <p:blipFill>
-          <a:blip r:embed="rId4"/>
-          <a:stretch>
-            <a:fillRect/>
-          </a:stretch>
-        </p:blipFill>
-        <p:spPr>
-          <a:xfrm>
-            <a:off x="7887290" y="2710106"/>
-            <a:ext cx="2773652" cy="2188550"/>
-          </a:xfrm>
-          <a:prstGeom prst="rect">
-            <a:avLst/>
-          </a:prstGeom>
-        </p:spPr>
-      </p:pic>
-      <p:pic>
-        <p:nvPicPr>
-          <p:cNvPr id="5" name="Picture 4">
-            <a:extLst>
-              <a:ext uri="{FF2B5EF4-FFF2-40B4-BE49-F238E27FC236}">
-                <a16:creationId xmlns:a16="http://schemas.microsoft.com/office/drawing/2014/main" id="{BFA9F407-B826-4F25-A6B1-08B85CBE3BDC}"/>
-              </a:ext>
-            </a:extLst>
-          </p:cNvPr>
-          <p:cNvPicPr>
-            <a:picLocks noChangeAspect="1"/>
-          </p:cNvPicPr>
-          <p:nvPr/>
-        </p:nvPicPr>
-        <p:blipFill>
-          <a:blip r:embed="rId5"/>
-          <a:stretch>
-            <a:fillRect/>
-          </a:stretch>
-        </p:blipFill>
-        <p:spPr>
-          <a:xfrm>
-            <a:off x="677316" y="2932778"/>
-            <a:ext cx="6939950" cy="1840306"/>
-          </a:xfrm>
-          <a:prstGeom prst="rect">
-            <a:avLst/>
-          </a:prstGeom>
-        </p:spPr>
-      </p:pic>
       <p:sp>
         <p:nvSpPr>
           <p:cNvPr id="10" name="Google Shape;289;geef53d5d55_1_89">
@@ -37232,6 +37172,66 @@
           </a:p>
         </p:txBody>
       </p:sp>
+      <p:pic>
+        <p:nvPicPr>
+          <p:cNvPr id="3" name="Picture 2">
+            <a:extLst>
+              <a:ext uri="{FF2B5EF4-FFF2-40B4-BE49-F238E27FC236}">
+                <a16:creationId xmlns:a16="http://schemas.microsoft.com/office/drawing/2014/main" id="{9DBA3418-C970-49B3-8EF6-47717D19DA53}"/>
+              </a:ext>
+            </a:extLst>
+          </p:cNvPr>
+          <p:cNvPicPr>
+            <a:picLocks noChangeAspect="1"/>
+          </p:cNvPicPr>
+          <p:nvPr/>
+        </p:nvPicPr>
+        <p:blipFill>
+          <a:blip r:embed="rId4"/>
+          <a:stretch>
+            <a:fillRect/>
+          </a:stretch>
+        </p:blipFill>
+        <p:spPr>
+          <a:xfrm>
+            <a:off x="7399176" y="2887686"/>
+            <a:ext cx="4305490" cy="2709887"/>
+          </a:xfrm>
+          <a:prstGeom prst="rect">
+            <a:avLst/>
+          </a:prstGeom>
+        </p:spPr>
+      </p:pic>
+      <p:pic>
+        <p:nvPicPr>
+          <p:cNvPr id="6" name="Picture 5">
+            <a:extLst>
+              <a:ext uri="{FF2B5EF4-FFF2-40B4-BE49-F238E27FC236}">
+                <a16:creationId xmlns:a16="http://schemas.microsoft.com/office/drawing/2014/main" id="{B922AFB0-3D0C-47C2-9697-CF78FB3C173E}"/>
+              </a:ext>
+            </a:extLst>
+          </p:cNvPr>
+          <p:cNvPicPr>
+            <a:picLocks noChangeAspect="1"/>
+          </p:cNvPicPr>
+          <p:nvPr/>
+        </p:nvPicPr>
+        <p:blipFill>
+          <a:blip r:embed="rId5"/>
+          <a:stretch>
+            <a:fillRect/>
+          </a:stretch>
+        </p:blipFill>
+        <p:spPr>
+          <a:xfrm>
+            <a:off x="317636" y="2981409"/>
+            <a:ext cx="7003387" cy="2522439"/>
+          </a:xfrm>
+          <a:prstGeom prst="rect">
+            <a:avLst/>
+          </a:prstGeom>
+        </p:spPr>
+      </p:pic>
     </p:spTree>
   </p:cSld>
   <p:clrMapOvr>
@@ -37494,8 +37494,38 @@
         </p:blipFill>
         <p:spPr>
           <a:xfrm>
-            <a:off x="436162" y="1791540"/>
-            <a:ext cx="8184589" cy="3497883"/>
+            <a:off x="1497140" y="1459104"/>
+            <a:ext cx="5012916" cy="2142391"/>
+          </a:xfrm>
+          <a:prstGeom prst="rect">
+            <a:avLst/>
+          </a:prstGeom>
+        </p:spPr>
+      </p:pic>
+      <p:pic>
+        <p:nvPicPr>
+          <p:cNvPr id="2" name="Picture 1">
+            <a:extLst>
+              <a:ext uri="{FF2B5EF4-FFF2-40B4-BE49-F238E27FC236}">
+                <a16:creationId xmlns:a16="http://schemas.microsoft.com/office/drawing/2014/main" id="{9CEC0EE6-D217-441B-96B9-324C514F7AC1}"/>
+              </a:ext>
+            </a:extLst>
+          </p:cNvPr>
+          <p:cNvPicPr>
+            <a:picLocks noChangeAspect="1"/>
+          </p:cNvPicPr>
+          <p:nvPr/>
+        </p:nvPicPr>
+        <p:blipFill>
+          <a:blip r:embed="rId5"/>
+          <a:stretch>
+            <a:fillRect/>
+          </a:stretch>
+        </p:blipFill>
+        <p:spPr>
+          <a:xfrm>
+            <a:off x="2917875" y="3834570"/>
+            <a:ext cx="7627394" cy="2915863"/>
           </a:xfrm>
           <a:prstGeom prst="rect">
             <a:avLst/>
@@ -37956,7 +37986,7 @@
               </a:spcAft>
               <a:buNone/>
             </a:pPr>
-            <a:endParaRPr>
+            <a:endParaRPr dirty="0">
               <a:solidFill>
                 <a:schemeClr val="lt1"/>
               </a:solidFill>
@@ -37979,7 +38009,7 @@
               </a:spcAft>
               <a:buNone/>
             </a:pPr>
-            <a:endParaRPr sz="1150">
+            <a:endParaRPr sz="1150" dirty="0">
               <a:solidFill>
                 <a:srgbClr val="D69D85"/>
               </a:solidFill>
@@ -38002,7 +38032,7 @@
               </a:spcAft>
               <a:buNone/>
             </a:pPr>
-            <a:endParaRPr>
+            <a:endParaRPr dirty="0">
               <a:solidFill>
                 <a:schemeClr val="lt1"/>
               </a:solidFill>
@@ -38107,13 +38137,15 @@
       <p:cxnSp>
         <p:nvCxnSpPr>
           <p:cNvPr id="348" name="Google Shape;348;geef53d5d55_1_159"/>
-          <p:cNvCxnSpPr/>
+          <p:cNvCxnSpPr>
+            <a:cxnSpLocks/>
+          </p:cNvCxnSpPr>
           <p:nvPr/>
         </p:nvCxnSpPr>
         <p:spPr>
           <a:xfrm>
-            <a:off x="358679" y="942649"/>
-            <a:ext cx="5210700" cy="0"/>
+            <a:off x="233271" y="961310"/>
+            <a:ext cx="7455153" cy="0"/>
           </a:xfrm>
           <a:prstGeom prst="straightConnector1">
             <a:avLst/>
@@ -38155,6 +38187,36 @@
           <a:ln>
             <a:noFill/>
           </a:ln>
+        </p:spPr>
+      </p:pic>
+      <p:pic>
+        <p:nvPicPr>
+          <p:cNvPr id="3" name="Picture 2">
+            <a:extLst>
+              <a:ext uri="{FF2B5EF4-FFF2-40B4-BE49-F238E27FC236}">
+                <a16:creationId xmlns:a16="http://schemas.microsoft.com/office/drawing/2014/main" id="{2992E9E9-EE5F-430D-A3AF-9F86020509CC}"/>
+              </a:ext>
+            </a:extLst>
+          </p:cNvPr>
+          <p:cNvPicPr>
+            <a:picLocks noChangeAspect="1"/>
+          </p:cNvPicPr>
+          <p:nvPr/>
+        </p:nvPicPr>
+        <p:blipFill>
+          <a:blip r:embed="rId4"/>
+          <a:stretch>
+            <a:fillRect/>
+          </a:stretch>
+        </p:blipFill>
+        <p:spPr>
+          <a:xfrm>
+            <a:off x="677316" y="1110346"/>
+            <a:ext cx="9374155" cy="4921836"/>
+          </a:xfrm>
+          <a:prstGeom prst="rect">
+            <a:avLst/>
+          </a:prstGeom>
         </p:spPr>
       </p:pic>
     </p:spTree>

</xml_diff>